<commit_message>
updated stake snapshot diagram
</commit_message>
<xml_diff>
--- a/voltaire/design-doc/Stake-Snapshots.pptx
+++ b/voltaire/design-doc/Stake-Snapshots.pptx
@@ -243,7 +243,7 @@
           <a:p>
             <a:fld id="{84603096-624E-7441-973C-9BD52C80BD5D}" type="datetimeFigureOut">
               <a:rPr lang="en-US" smtClean="0"/>
-              <a:t>2/25/21</a:t>
+              <a:t>5/5/21</a:t>
             </a:fld>
             <a:endParaRPr lang="en-US"/>
           </a:p>
@@ -413,7 +413,7 @@
           <a:p>
             <a:fld id="{84603096-624E-7441-973C-9BD52C80BD5D}" type="datetimeFigureOut">
               <a:rPr lang="en-US" smtClean="0"/>
-              <a:t>2/25/21</a:t>
+              <a:t>5/5/21</a:t>
             </a:fld>
             <a:endParaRPr lang="en-US"/>
           </a:p>
@@ -593,7 +593,7 @@
           <a:p>
             <a:fld id="{84603096-624E-7441-973C-9BD52C80BD5D}" type="datetimeFigureOut">
               <a:rPr lang="en-US" smtClean="0"/>
-              <a:t>2/25/21</a:t>
+              <a:t>5/5/21</a:t>
             </a:fld>
             <a:endParaRPr lang="en-US"/>
           </a:p>
@@ -763,7 +763,7 @@
           <a:p>
             <a:fld id="{84603096-624E-7441-973C-9BD52C80BD5D}" type="datetimeFigureOut">
               <a:rPr lang="en-US" smtClean="0"/>
-              <a:t>2/25/21</a:t>
+              <a:t>5/5/21</a:t>
             </a:fld>
             <a:endParaRPr lang="en-US"/>
           </a:p>
@@ -1009,7 +1009,7 @@
           <a:p>
             <a:fld id="{84603096-624E-7441-973C-9BD52C80BD5D}" type="datetimeFigureOut">
               <a:rPr lang="en-US" smtClean="0"/>
-              <a:t>2/25/21</a:t>
+              <a:t>5/5/21</a:t>
             </a:fld>
             <a:endParaRPr lang="en-US"/>
           </a:p>
@@ -1241,7 +1241,7 @@
           <a:p>
             <a:fld id="{84603096-624E-7441-973C-9BD52C80BD5D}" type="datetimeFigureOut">
               <a:rPr lang="en-US" smtClean="0"/>
-              <a:t>2/25/21</a:t>
+              <a:t>5/5/21</a:t>
             </a:fld>
             <a:endParaRPr lang="en-US"/>
           </a:p>
@@ -1608,7 +1608,7 @@
           <a:p>
             <a:fld id="{84603096-624E-7441-973C-9BD52C80BD5D}" type="datetimeFigureOut">
               <a:rPr lang="en-US" smtClean="0"/>
-              <a:t>2/25/21</a:t>
+              <a:t>5/5/21</a:t>
             </a:fld>
             <a:endParaRPr lang="en-US"/>
           </a:p>
@@ -1726,7 +1726,7 @@
           <a:p>
             <a:fld id="{84603096-624E-7441-973C-9BD52C80BD5D}" type="datetimeFigureOut">
               <a:rPr lang="en-US" smtClean="0"/>
-              <a:t>2/25/21</a:t>
+              <a:t>5/5/21</a:t>
             </a:fld>
             <a:endParaRPr lang="en-US"/>
           </a:p>
@@ -1821,7 +1821,7 @@
           <a:p>
             <a:fld id="{84603096-624E-7441-973C-9BD52C80BD5D}" type="datetimeFigureOut">
               <a:rPr lang="en-US" smtClean="0"/>
-              <a:t>2/25/21</a:t>
+              <a:t>5/5/21</a:t>
             </a:fld>
             <a:endParaRPr lang="en-US"/>
           </a:p>
@@ -2098,7 +2098,7 @@
           <a:p>
             <a:fld id="{84603096-624E-7441-973C-9BD52C80BD5D}" type="datetimeFigureOut">
               <a:rPr lang="en-US" smtClean="0"/>
-              <a:t>2/25/21</a:t>
+              <a:t>5/5/21</a:t>
             </a:fld>
             <a:endParaRPr lang="en-US"/>
           </a:p>
@@ -2355,7 +2355,7 @@
           <a:p>
             <a:fld id="{84603096-624E-7441-973C-9BD52C80BD5D}" type="datetimeFigureOut">
               <a:rPr lang="en-US" smtClean="0"/>
-              <a:t>2/25/21</a:t>
+              <a:t>5/5/21</a:t>
             </a:fld>
             <a:endParaRPr lang="en-US"/>
           </a:p>
@@ -2568,7 +2568,7 @@
           <a:p>
             <a:fld id="{84603096-624E-7441-973C-9BD52C80BD5D}" type="datetimeFigureOut">
               <a:rPr lang="en-US" smtClean="0"/>
-              <a:t>2/25/21</a:t>
+              <a:t>5/5/21</a:t>
             </a:fld>
             <a:endParaRPr lang="en-US"/>
           </a:p>
@@ -3795,9 +3795,11 @@
             <a:avLst/>
           </a:prstGeom>
           <a:solidFill>
-            <a:srgbClr val="7030A0">
+            <a:schemeClr val="accent4">
+              <a:lumMod val="20000"/>
+              <a:lumOff val="80000"/>
               <a:alpha val="17000"/>
-            </a:srgbClr>
+            </a:schemeClr>
           </a:solidFill>
           <a:ln>
             <a:solidFill>
@@ -3879,23 +3881,22 @@
       </p:sp>
       <p:cxnSp>
         <p:nvCxnSpPr>
-          <p:cNvPr id="49" name="Straight Arrow Connector 48">
+          <p:cNvPr id="67" name="Straight Arrow Connector 66">
             <a:extLst>
               <a:ext uri="{FF2B5EF4-FFF2-40B4-BE49-F238E27FC236}">
-                <a16:creationId xmlns:a16="http://schemas.microsoft.com/office/drawing/2014/main" id="{D63113AA-B039-9C4B-893B-3D01FAA4D38C}"/>
+                <a16:creationId xmlns:a16="http://schemas.microsoft.com/office/drawing/2014/main" id="{DFAFF671-1DC2-EB47-A092-ACACDA96DA96}"/>
               </a:ext>
             </a:extLst>
           </p:cNvPr>
           <p:cNvCxnSpPr>
             <a:cxnSpLocks/>
-            <a:endCxn id="72" idx="0"/>
           </p:cNvCxnSpPr>
           <p:nvPr/>
         </p:nvCxnSpPr>
         <p:spPr>
           <a:xfrm>
-            <a:off x="6819845" y="1986078"/>
-            <a:ext cx="792324" cy="1732035"/>
+            <a:off x="9686441" y="5201382"/>
+            <a:ext cx="1023998" cy="0"/>
           </a:xfrm>
           <a:prstGeom prst="straightConnector1">
             <a:avLst/>
@@ -3924,53 +3925,6 @@
           </a:fontRef>
         </p:style>
       </p:cxnSp>
-      <p:cxnSp>
-        <p:nvCxnSpPr>
-          <p:cNvPr id="67" name="Straight Arrow Connector 66">
-            <a:extLst>
-              <a:ext uri="{FF2B5EF4-FFF2-40B4-BE49-F238E27FC236}">
-                <a16:creationId xmlns:a16="http://schemas.microsoft.com/office/drawing/2014/main" id="{DFAFF671-1DC2-EB47-A092-ACACDA96DA96}"/>
-              </a:ext>
-            </a:extLst>
-          </p:cNvPr>
-          <p:cNvCxnSpPr>
-            <a:cxnSpLocks/>
-            <a:stCxn id="66" idx="3"/>
-          </p:cNvCxnSpPr>
-          <p:nvPr/>
-        </p:nvCxnSpPr>
-        <p:spPr>
-          <a:xfrm>
-            <a:off x="9571836" y="4032344"/>
-            <a:ext cx="1138603" cy="0"/>
-          </a:xfrm>
-          <a:prstGeom prst="straightConnector1">
-            <a:avLst/>
-          </a:prstGeom>
-          <a:ln w="25400">
-            <a:solidFill>
-              <a:schemeClr val="accent1">
-                <a:lumMod val="75000"/>
-              </a:schemeClr>
-            </a:solidFill>
-            <a:tailEnd type="triangle"/>
-          </a:ln>
-        </p:spPr>
-        <p:style>
-          <a:lnRef idx="1">
-            <a:schemeClr val="accent1"/>
-          </a:lnRef>
-          <a:fillRef idx="0">
-            <a:schemeClr val="accent1"/>
-          </a:fillRef>
-          <a:effectRef idx="0">
-            <a:schemeClr val="accent1"/>
-          </a:effectRef>
-          <a:fontRef idx="minor">
-            <a:schemeClr val="tx1"/>
-          </a:fontRef>
-        </p:style>
-      </p:cxnSp>
       <p:sp>
         <p:nvSpPr>
           <p:cNvPr id="72" name="TextBox 71">
@@ -3985,8 +3939,8 @@
         </p:nvSpPr>
         <p:spPr>
           <a:xfrm>
-            <a:off x="7044193" y="3718113"/>
-            <a:ext cx="1135952" cy="646331"/>
+            <a:off x="6602928" y="3718113"/>
+            <a:ext cx="3083513" cy="646331"/>
           </a:xfrm>
           <a:prstGeom prst="rect">
             <a:avLst/>
@@ -4004,7 +3958,7 @@
           </a:ln>
         </p:spPr>
         <p:txBody>
-          <a:bodyPr wrap="none" rtlCol="0">
+          <a:bodyPr wrap="square" rtlCol="0">
             <a:spAutoFit/>
           </a:bodyPr>
           <a:lstStyle/>
@@ -4020,106 +3974,6 @@
             <a:r>
               <a:rPr lang="en-US" dirty="0"/>
               <a:t>Delegated</a:t>
-            </a:r>
-          </a:p>
-        </p:txBody>
-      </p:sp>
-      <p:sp>
-        <p:nvSpPr>
-          <p:cNvPr id="86" name="Rectangle 85">
-            <a:extLst>
-              <a:ext uri="{FF2B5EF4-FFF2-40B4-BE49-F238E27FC236}">
-                <a16:creationId xmlns:a16="http://schemas.microsoft.com/office/drawing/2014/main" id="{8F11F709-B545-414F-B66C-E5F27F1835D8}"/>
-              </a:ext>
-            </a:extLst>
-          </p:cNvPr>
-          <p:cNvSpPr/>
-          <p:nvPr/>
-        </p:nvSpPr>
-        <p:spPr>
-          <a:xfrm>
-            <a:off x="8889357" y="3709178"/>
-            <a:ext cx="667474" cy="646331"/>
-          </a:xfrm>
-          <a:prstGeom prst="rect">
-            <a:avLst/>
-          </a:prstGeom>
-          <a:solidFill>
-            <a:schemeClr val="bg1"/>
-          </a:solidFill>
-        </p:spPr>
-        <p:style>
-          <a:lnRef idx="2">
-            <a:schemeClr val="accent1">
-              <a:shade val="50000"/>
-            </a:schemeClr>
-          </a:lnRef>
-          <a:fillRef idx="1">
-            <a:schemeClr val="accent1"/>
-          </a:fillRef>
-          <a:effectRef idx="0">
-            <a:schemeClr val="accent1"/>
-          </a:effectRef>
-          <a:fontRef idx="minor">
-            <a:schemeClr val="lt1"/>
-          </a:fontRef>
-        </p:style>
-        <p:txBody>
-          <a:bodyPr rtlCol="0" anchor="ctr"/>
-          <a:lstStyle/>
-          <a:p>
-            <a:pPr algn="ctr"/>
-            <a:endParaRPr lang="en-US"/>
-          </a:p>
-        </p:txBody>
-      </p:sp>
-      <p:sp>
-        <p:nvSpPr>
-          <p:cNvPr id="66" name="TextBox 65">
-            <a:extLst>
-              <a:ext uri="{FF2B5EF4-FFF2-40B4-BE49-F238E27FC236}">
-                <a16:creationId xmlns:a16="http://schemas.microsoft.com/office/drawing/2014/main" id="{84EB4E45-DCF2-1942-9976-DA766095B76A}"/>
-              </a:ext>
-            </a:extLst>
-          </p:cNvPr>
-          <p:cNvSpPr txBox="1"/>
-          <p:nvPr/>
-        </p:nvSpPr>
-        <p:spPr>
-          <a:xfrm>
-            <a:off x="8863950" y="3709178"/>
-            <a:ext cx="707886" cy="646331"/>
-          </a:xfrm>
-          <a:prstGeom prst="rect">
-            <a:avLst/>
-          </a:prstGeom>
-          <a:solidFill>
-            <a:schemeClr val="accent1">
-              <a:lumMod val="75000"/>
-              <a:alpha val="17000"/>
-            </a:schemeClr>
-          </a:solidFill>
-          <a:ln>
-            <a:noFill/>
-          </a:ln>
-        </p:spPr>
-        <p:txBody>
-          <a:bodyPr wrap="square" rtlCol="0">
-            <a:spAutoFit/>
-          </a:bodyPr>
-          <a:lstStyle/>
-          <a:p>
-            <a:pPr algn="ctr"/>
-            <a:r>
-              <a:rPr lang="en-US" dirty="0"/>
-              <a:t>Votes</a:t>
-            </a:r>
-            <a:br>
-              <a:rPr lang="en-US" dirty="0"/>
-            </a:br>
-            <a:r>
-              <a:rPr lang="en-US" dirty="0"/>
-              <a:t>Cast</a:t>
             </a:r>
           </a:p>
         </p:txBody>
@@ -4135,14 +3989,13 @@
           </p:cNvPr>
           <p:cNvCxnSpPr>
             <a:cxnSpLocks/>
-            <a:stCxn id="72" idx="3"/>
           </p:cNvCxnSpPr>
           <p:nvPr/>
         </p:nvCxnSpPr>
         <p:spPr>
           <a:xfrm>
-            <a:off x="8180145" y="4041279"/>
-            <a:ext cx="709212" cy="0"/>
+            <a:off x="9686441" y="4370666"/>
+            <a:ext cx="0" cy="507551"/>
           </a:xfrm>
           <a:prstGeom prst="straightConnector1">
             <a:avLst/>
@@ -4152,51 +4005,6 @@
               <a:schemeClr val="accent1">
                 <a:lumMod val="75000"/>
               </a:schemeClr>
-            </a:solidFill>
-            <a:tailEnd type="triangle"/>
-          </a:ln>
-        </p:spPr>
-        <p:style>
-          <a:lnRef idx="1">
-            <a:schemeClr val="accent1"/>
-          </a:lnRef>
-          <a:fillRef idx="0">
-            <a:schemeClr val="accent1"/>
-          </a:fillRef>
-          <a:effectRef idx="0">
-            <a:schemeClr val="accent1"/>
-          </a:effectRef>
-          <a:fontRef idx="minor">
-            <a:schemeClr val="tx1"/>
-          </a:fontRef>
-        </p:style>
-      </p:cxnSp>
-      <p:cxnSp>
-        <p:nvCxnSpPr>
-          <p:cNvPr id="87" name="Straight Arrow Connector 86">
-            <a:extLst>
-              <a:ext uri="{FF2B5EF4-FFF2-40B4-BE49-F238E27FC236}">
-                <a16:creationId xmlns:a16="http://schemas.microsoft.com/office/drawing/2014/main" id="{79DF854E-FA88-6E42-88F1-0C334DF886A9}"/>
-              </a:ext>
-            </a:extLst>
-          </p:cNvPr>
-          <p:cNvCxnSpPr>
-            <a:cxnSpLocks/>
-            <a:endCxn id="89" idx="0"/>
-          </p:cNvCxnSpPr>
-          <p:nvPr/>
-        </p:nvCxnSpPr>
-        <p:spPr>
-          <a:xfrm>
-            <a:off x="1790398" y="1986078"/>
-            <a:ext cx="792324" cy="1732035"/>
-          </a:xfrm>
-          <a:prstGeom prst="straightConnector1">
-            <a:avLst/>
-          </a:prstGeom>
-          <a:ln w="25400">
-            <a:solidFill>
-              <a:schemeClr val="accent6"/>
             </a:solidFill>
             <a:tailEnd type="triangle"/>
           </a:ln>
@@ -4227,13 +4035,12 @@
           </p:cNvPr>
           <p:cNvCxnSpPr>
             <a:cxnSpLocks/>
-            <a:stCxn id="91" idx="3"/>
           </p:cNvCxnSpPr>
           <p:nvPr/>
         </p:nvCxnSpPr>
         <p:spPr>
           <a:xfrm>
-            <a:off x="4529993" y="4041279"/>
+            <a:off x="4529993" y="5257621"/>
             <a:ext cx="1138603" cy="0"/>
           </a:xfrm>
           <a:prstGeom prst="straightConnector1">
@@ -4275,8 +4082,8 @@
         </p:nvSpPr>
         <p:spPr>
           <a:xfrm>
-            <a:off x="2014746" y="3718113"/>
-            <a:ext cx="1135952" cy="646331"/>
+            <a:off x="1578019" y="3718113"/>
+            <a:ext cx="2951973" cy="646331"/>
           </a:xfrm>
           <a:prstGeom prst="rect">
             <a:avLst/>
@@ -4293,7 +4100,7 @@
           </a:ln>
         </p:spPr>
         <p:txBody>
-          <a:bodyPr wrap="none" rtlCol="0">
+          <a:bodyPr wrap="square" rtlCol="0">
             <a:spAutoFit/>
           </a:bodyPr>
           <a:lstStyle/>
@@ -4309,105 +4116,6 @@
             <a:r>
               <a:rPr lang="en-US" dirty="0"/>
               <a:t>Delegated</a:t>
-            </a:r>
-          </a:p>
-        </p:txBody>
-      </p:sp>
-      <p:sp>
-        <p:nvSpPr>
-          <p:cNvPr id="90" name="Rectangle 89">
-            <a:extLst>
-              <a:ext uri="{FF2B5EF4-FFF2-40B4-BE49-F238E27FC236}">
-                <a16:creationId xmlns:a16="http://schemas.microsoft.com/office/drawing/2014/main" id="{21959A0F-DCE2-2F44-B47A-1033EDCB3011}"/>
-              </a:ext>
-            </a:extLst>
-          </p:cNvPr>
-          <p:cNvSpPr/>
-          <p:nvPr/>
-        </p:nvSpPr>
-        <p:spPr>
-          <a:xfrm>
-            <a:off x="3833177" y="3689994"/>
-            <a:ext cx="667474" cy="646331"/>
-          </a:xfrm>
-          <a:prstGeom prst="rect">
-            <a:avLst/>
-          </a:prstGeom>
-          <a:solidFill>
-            <a:schemeClr val="bg1"/>
-          </a:solidFill>
-        </p:spPr>
-        <p:style>
-          <a:lnRef idx="2">
-            <a:schemeClr val="accent1">
-              <a:shade val="50000"/>
-            </a:schemeClr>
-          </a:lnRef>
-          <a:fillRef idx="1">
-            <a:schemeClr val="accent1"/>
-          </a:fillRef>
-          <a:effectRef idx="0">
-            <a:schemeClr val="accent1"/>
-          </a:effectRef>
-          <a:fontRef idx="minor">
-            <a:schemeClr val="lt1"/>
-          </a:fontRef>
-        </p:style>
-        <p:txBody>
-          <a:bodyPr rtlCol="0" anchor="ctr"/>
-          <a:lstStyle/>
-          <a:p>
-            <a:pPr algn="ctr"/>
-            <a:endParaRPr lang="en-US"/>
-          </a:p>
-        </p:txBody>
-      </p:sp>
-      <p:sp>
-        <p:nvSpPr>
-          <p:cNvPr id="91" name="TextBox 90">
-            <a:extLst>
-              <a:ext uri="{FF2B5EF4-FFF2-40B4-BE49-F238E27FC236}">
-                <a16:creationId xmlns:a16="http://schemas.microsoft.com/office/drawing/2014/main" id="{D11193DA-B2DC-C441-8437-36B02EE73821}"/>
-              </a:ext>
-            </a:extLst>
-          </p:cNvPr>
-          <p:cNvSpPr txBox="1"/>
-          <p:nvPr/>
-        </p:nvSpPr>
-        <p:spPr>
-          <a:xfrm>
-            <a:off x="3822107" y="3718113"/>
-            <a:ext cx="707886" cy="646331"/>
-          </a:xfrm>
-          <a:prstGeom prst="rect">
-            <a:avLst/>
-          </a:prstGeom>
-          <a:solidFill>
-            <a:schemeClr val="accent6">
-              <a:alpha val="17000"/>
-            </a:schemeClr>
-          </a:solidFill>
-          <a:ln>
-            <a:noFill/>
-          </a:ln>
-        </p:spPr>
-        <p:txBody>
-          <a:bodyPr wrap="square" rtlCol="0">
-            <a:spAutoFit/>
-          </a:bodyPr>
-          <a:lstStyle/>
-          <a:p>
-            <a:pPr algn="ctr"/>
-            <a:r>
-              <a:rPr lang="en-US" dirty="0"/>
-              <a:t>Votes</a:t>
-            </a:r>
-            <a:br>
-              <a:rPr lang="en-US" dirty="0"/>
-            </a:br>
-            <a:r>
-              <a:rPr lang="en-US" dirty="0"/>
-              <a:t>Cast</a:t>
             </a:r>
           </a:p>
         </p:txBody>
@@ -4423,14 +4131,13 @@
           </p:cNvPr>
           <p:cNvCxnSpPr>
             <a:cxnSpLocks/>
-            <a:stCxn id="89" idx="3"/>
           </p:cNvCxnSpPr>
           <p:nvPr/>
         </p:nvCxnSpPr>
         <p:spPr>
           <a:xfrm>
-            <a:off x="3150698" y="4041279"/>
-            <a:ext cx="709212" cy="0"/>
+            <a:off x="4529026" y="4364444"/>
+            <a:ext cx="0" cy="564133"/>
           </a:xfrm>
           <a:prstGeom prst="straightConnector1">
             <a:avLst/>
@@ -4438,51 +4145,6 @@
           <a:ln w="25400">
             <a:solidFill>
               <a:schemeClr val="accent6"/>
-            </a:solidFill>
-            <a:tailEnd type="triangle"/>
-          </a:ln>
-        </p:spPr>
-        <p:style>
-          <a:lnRef idx="1">
-            <a:schemeClr val="accent1"/>
-          </a:lnRef>
-          <a:fillRef idx="0">
-            <a:schemeClr val="accent1"/>
-          </a:fillRef>
-          <a:effectRef idx="0">
-            <a:schemeClr val="accent1"/>
-          </a:effectRef>
-          <a:fontRef idx="minor">
-            <a:schemeClr val="tx1"/>
-          </a:fontRef>
-        </p:style>
-      </p:cxnSp>
-      <p:cxnSp>
-        <p:nvCxnSpPr>
-          <p:cNvPr id="95" name="Straight Arrow Connector 94">
-            <a:extLst>
-              <a:ext uri="{FF2B5EF4-FFF2-40B4-BE49-F238E27FC236}">
-                <a16:creationId xmlns:a16="http://schemas.microsoft.com/office/drawing/2014/main" id="{5045118C-BC78-AC48-AC15-EED8E0C4579B}"/>
-              </a:ext>
-            </a:extLst>
-          </p:cNvPr>
-          <p:cNvCxnSpPr>
-            <a:cxnSpLocks/>
-            <a:endCxn id="97" idx="0"/>
-          </p:cNvCxnSpPr>
-          <p:nvPr/>
-        </p:nvCxnSpPr>
-        <p:spPr>
-          <a:xfrm>
-            <a:off x="11844595" y="1992300"/>
-            <a:ext cx="792324" cy="1732035"/>
-          </a:xfrm>
-          <a:prstGeom prst="straightConnector1">
-            <a:avLst/>
-          </a:prstGeom>
-          <a:ln w="25400">
-            <a:solidFill>
-              <a:schemeClr val="accent2"/>
             </a:solidFill>
             <a:tailEnd type="triangle"/>
           </a:ln>
@@ -4513,13 +4175,12 @@
           </p:cNvPr>
           <p:cNvCxnSpPr>
             <a:cxnSpLocks/>
-            <a:stCxn id="99" idx="3"/>
           </p:cNvCxnSpPr>
           <p:nvPr/>
         </p:nvCxnSpPr>
         <p:spPr>
           <a:xfrm>
-            <a:off x="14596586" y="4038566"/>
+            <a:off x="14577886" y="5224183"/>
             <a:ext cx="1138603" cy="0"/>
           </a:xfrm>
           <a:prstGeom prst="straightConnector1">
@@ -4561,8 +4222,8 @@
         </p:nvSpPr>
         <p:spPr>
           <a:xfrm>
-            <a:off x="12068943" y="3724335"/>
-            <a:ext cx="1135952" cy="646331"/>
+            <a:off x="11591043" y="3724335"/>
+            <a:ext cx="2986842" cy="646331"/>
           </a:xfrm>
           <a:prstGeom prst="rect">
             <a:avLst/>
@@ -4599,105 +4260,6 @@
           </a:p>
         </p:txBody>
       </p:sp>
-      <p:sp>
-        <p:nvSpPr>
-          <p:cNvPr id="98" name="Rectangle 97">
-            <a:extLst>
-              <a:ext uri="{FF2B5EF4-FFF2-40B4-BE49-F238E27FC236}">
-                <a16:creationId xmlns:a16="http://schemas.microsoft.com/office/drawing/2014/main" id="{84BED497-7F8F-1E45-9560-2FEF9BCDCA10}"/>
-              </a:ext>
-            </a:extLst>
-          </p:cNvPr>
-          <p:cNvSpPr/>
-          <p:nvPr/>
-        </p:nvSpPr>
-        <p:spPr>
-          <a:xfrm>
-            <a:off x="13914107" y="3715400"/>
-            <a:ext cx="667474" cy="646331"/>
-          </a:xfrm>
-          <a:prstGeom prst="rect">
-            <a:avLst/>
-          </a:prstGeom>
-          <a:solidFill>
-            <a:schemeClr val="bg1"/>
-          </a:solidFill>
-        </p:spPr>
-        <p:style>
-          <a:lnRef idx="2">
-            <a:schemeClr val="accent1">
-              <a:shade val="50000"/>
-            </a:schemeClr>
-          </a:lnRef>
-          <a:fillRef idx="1">
-            <a:schemeClr val="accent1"/>
-          </a:fillRef>
-          <a:effectRef idx="0">
-            <a:schemeClr val="accent1"/>
-          </a:effectRef>
-          <a:fontRef idx="minor">
-            <a:schemeClr val="lt1"/>
-          </a:fontRef>
-        </p:style>
-        <p:txBody>
-          <a:bodyPr rtlCol="0" anchor="ctr"/>
-          <a:lstStyle/>
-          <a:p>
-            <a:pPr algn="ctr"/>
-            <a:endParaRPr lang="en-US"/>
-          </a:p>
-        </p:txBody>
-      </p:sp>
-      <p:sp>
-        <p:nvSpPr>
-          <p:cNvPr id="99" name="TextBox 98">
-            <a:extLst>
-              <a:ext uri="{FF2B5EF4-FFF2-40B4-BE49-F238E27FC236}">
-                <a16:creationId xmlns:a16="http://schemas.microsoft.com/office/drawing/2014/main" id="{C8339FCF-FAA9-9940-8925-1CBB716BEF3B}"/>
-              </a:ext>
-            </a:extLst>
-          </p:cNvPr>
-          <p:cNvSpPr txBox="1"/>
-          <p:nvPr/>
-        </p:nvSpPr>
-        <p:spPr>
-          <a:xfrm>
-            <a:off x="13888700" y="3715400"/>
-            <a:ext cx="707886" cy="646331"/>
-          </a:xfrm>
-          <a:prstGeom prst="rect">
-            <a:avLst/>
-          </a:prstGeom>
-          <a:solidFill>
-            <a:schemeClr val="accent2">
-              <a:alpha val="17000"/>
-            </a:schemeClr>
-          </a:solidFill>
-          <a:ln>
-            <a:noFill/>
-          </a:ln>
-        </p:spPr>
-        <p:txBody>
-          <a:bodyPr wrap="square" rtlCol="0">
-            <a:spAutoFit/>
-          </a:bodyPr>
-          <a:lstStyle/>
-          <a:p>
-            <a:pPr algn="ctr"/>
-            <a:r>
-              <a:rPr lang="en-US" dirty="0"/>
-              <a:t>Votes</a:t>
-            </a:r>
-            <a:br>
-              <a:rPr lang="en-US" dirty="0"/>
-            </a:br>
-            <a:r>
-              <a:rPr lang="en-US" dirty="0"/>
-              <a:t>Cast</a:t>
-            </a:r>
-          </a:p>
-        </p:txBody>
-      </p:sp>
       <p:cxnSp>
         <p:nvCxnSpPr>
           <p:cNvPr id="100" name="Straight Arrow Connector 99">
@@ -4709,14 +4271,13 @@
           </p:cNvPr>
           <p:cNvCxnSpPr>
             <a:cxnSpLocks/>
-            <a:stCxn id="97" idx="3"/>
           </p:cNvCxnSpPr>
           <p:nvPr/>
         </p:nvCxnSpPr>
         <p:spPr>
-          <a:xfrm>
-            <a:off x="13204895" y="4047501"/>
-            <a:ext cx="709212" cy="0"/>
+          <a:xfrm flipH="1">
+            <a:off x="14570474" y="4364445"/>
+            <a:ext cx="4548" cy="434765"/>
           </a:xfrm>
           <a:prstGeom prst="straightConnector1">
             <a:avLst/>
@@ -4807,13 +4368,13 @@
           <p:nvPr/>
         </p:nvCxnSpPr>
         <p:spPr>
-          <a:xfrm>
-            <a:off x="1729212" y="1979194"/>
-            <a:ext cx="4853353" cy="4540441"/>
+          <a:xfrm rot="16200000" flipH="1">
+            <a:off x="1423673" y="2284733"/>
+            <a:ext cx="4540440" cy="3929362"/>
           </a:xfrm>
           <a:prstGeom prst="bentConnector3">
             <a:avLst>
-              <a:gd name="adj1" fmla="val 871"/>
+              <a:gd name="adj1" fmla="val 99836"/>
             </a:avLst>
           </a:prstGeom>
           <a:ln w="38100">
@@ -4886,6 +4447,163 @@
           </a:fontRef>
         </p:style>
       </p:cxnSp>
+      <p:sp>
+        <p:nvSpPr>
+          <p:cNvPr id="48" name="TextBox 47">
+            <a:extLst>
+              <a:ext uri="{FF2B5EF4-FFF2-40B4-BE49-F238E27FC236}">
+                <a16:creationId xmlns:a16="http://schemas.microsoft.com/office/drawing/2014/main" id="{0FFDD3C3-D1D2-E04A-AD2D-FC12B530DF35}"/>
+              </a:ext>
+            </a:extLst>
+          </p:cNvPr>
+          <p:cNvSpPr txBox="1"/>
+          <p:nvPr/>
+        </p:nvSpPr>
+        <p:spPr>
+          <a:xfrm>
+            <a:off x="1577053" y="4878217"/>
+            <a:ext cx="2951973" cy="646331"/>
+          </a:xfrm>
+          <a:prstGeom prst="rect">
+            <a:avLst/>
+          </a:prstGeom>
+          <a:solidFill>
+            <a:schemeClr val="accent6">
+              <a:alpha val="17000"/>
+            </a:schemeClr>
+          </a:solidFill>
+          <a:ln>
+            <a:solidFill>
+              <a:schemeClr val="accent1"/>
+            </a:solidFill>
+          </a:ln>
+        </p:spPr>
+        <p:txBody>
+          <a:bodyPr wrap="square" rtlCol="0">
+            <a:spAutoFit/>
+          </a:bodyPr>
+          <a:lstStyle/>
+          <a:p>
+            <a:pPr algn="ctr"/>
+            <a:r>
+              <a:rPr lang="en-US" dirty="0"/>
+              <a:t>Votes</a:t>
+            </a:r>
+            <a:br>
+              <a:rPr lang="en-US" dirty="0"/>
+            </a:br>
+            <a:r>
+              <a:rPr lang="en-US" dirty="0"/>
+              <a:t>Cast</a:t>
+            </a:r>
+          </a:p>
+        </p:txBody>
+      </p:sp>
+      <p:sp>
+        <p:nvSpPr>
+          <p:cNvPr id="51" name="TextBox 50">
+            <a:extLst>
+              <a:ext uri="{FF2B5EF4-FFF2-40B4-BE49-F238E27FC236}">
+                <a16:creationId xmlns:a16="http://schemas.microsoft.com/office/drawing/2014/main" id="{E82E2F02-1705-4F46-9FAC-5C47D6F52360}"/>
+              </a:ext>
+            </a:extLst>
+          </p:cNvPr>
+          <p:cNvSpPr txBox="1"/>
+          <p:nvPr/>
+        </p:nvSpPr>
+        <p:spPr>
+          <a:xfrm>
+            <a:off x="6597567" y="4854781"/>
+            <a:ext cx="3083513" cy="646331"/>
+          </a:xfrm>
+          <a:prstGeom prst="rect">
+            <a:avLst/>
+          </a:prstGeom>
+          <a:solidFill>
+            <a:schemeClr val="accent1">
+              <a:lumMod val="75000"/>
+              <a:alpha val="17000"/>
+            </a:schemeClr>
+          </a:solidFill>
+          <a:ln>
+            <a:solidFill>
+              <a:schemeClr val="accent1"/>
+            </a:solidFill>
+          </a:ln>
+        </p:spPr>
+        <p:txBody>
+          <a:bodyPr wrap="square" rtlCol="0">
+            <a:spAutoFit/>
+          </a:bodyPr>
+          <a:lstStyle/>
+          <a:p>
+            <a:pPr algn="ctr"/>
+            <a:r>
+              <a:rPr lang="en-US" dirty="0"/>
+              <a:t>Votes</a:t>
+            </a:r>
+            <a:br>
+              <a:rPr lang="en-US" dirty="0"/>
+            </a:br>
+            <a:r>
+              <a:rPr lang="en-US" dirty="0"/>
+              <a:t>Cast</a:t>
+            </a:r>
+          </a:p>
+        </p:txBody>
+      </p:sp>
+      <p:sp>
+        <p:nvSpPr>
+          <p:cNvPr id="56" name="TextBox 55">
+            <a:extLst>
+              <a:ext uri="{FF2B5EF4-FFF2-40B4-BE49-F238E27FC236}">
+                <a16:creationId xmlns:a16="http://schemas.microsoft.com/office/drawing/2014/main" id="{F89E110A-EAD7-F54B-BAB4-6B50900056D4}"/>
+              </a:ext>
+            </a:extLst>
+          </p:cNvPr>
+          <p:cNvSpPr txBox="1"/>
+          <p:nvPr/>
+        </p:nvSpPr>
+        <p:spPr>
+          <a:xfrm>
+            <a:off x="11588180" y="4830780"/>
+            <a:ext cx="2986842" cy="646331"/>
+          </a:xfrm>
+          <a:prstGeom prst="rect">
+            <a:avLst/>
+          </a:prstGeom>
+          <a:solidFill>
+            <a:schemeClr val="accent2">
+              <a:alpha val="17000"/>
+            </a:schemeClr>
+          </a:solidFill>
+          <a:ln>
+            <a:solidFill>
+              <a:schemeClr val="accent2"/>
+            </a:solidFill>
+          </a:ln>
+        </p:spPr>
+        <p:txBody>
+          <a:bodyPr wrap="square" rtlCol="0">
+            <a:spAutoFit/>
+          </a:bodyPr>
+          <a:lstStyle/>
+          <a:p>
+            <a:pPr algn="ctr"/>
+            <a:r>
+              <a:rPr lang="en-US" dirty="0"/>
+              <a:t>Votes</a:t>
+            </a:r>
+            <a:br>
+              <a:rPr lang="en-US" dirty="0"/>
+            </a:br>
+            <a:r>
+              <a:rPr lang="en-US" dirty="0"/>
+              <a:t>Cast</a:t>
+            </a:r>
+          </a:p>
+        </p:txBody>
+      </p:sp>
     </p:spTree>
     <p:extLst>
       <p:ext uri="{BB962C8B-B14F-4D97-AF65-F5344CB8AC3E}">

</xml_diff>